<commit_message>
Presentation updated and icon added
</commit_message>
<xml_diff>
--- a/Documents/JustRecipe Presentation.pptx
+++ b/Documents/JustRecipe Presentation.pptx
@@ -5169,7 +5169,7 @@
         <p:spPr>
           <a:xfrm>
             <a:off x="414207" y="1368908"/>
-            <a:ext cx="4157794" cy="4216539"/>
+            <a:ext cx="4157794" cy="3985706"/>
           </a:xfrm>
           <a:prstGeom prst="rect">
             <a:avLst/>
@@ -5210,6 +5210,9 @@
               <a:lnSpc>
                 <a:spcPts val="3000"/>
               </a:lnSpc>
+              <a:spcAft>
+                <a:spcPts val="1000"/>
+              </a:spcAft>
               <a:buFont typeface="Arial" panose="020B0604020202020204" pitchFamily="34" charset="0"/>
               <a:buChar char="•"/>
             </a:pPr>
@@ -5217,16 +5220,6 @@
               <a:rPr lang="en-US" dirty="0"/>
               <a:t>User</a:t>
             </a:r>
-          </a:p>
-          <a:p>
-            <a:pPr marL="285750" lvl="0" indent="-285750">
-              <a:lnSpc>
-                <a:spcPts val="3000"/>
-              </a:lnSpc>
-              <a:buFont typeface="Arial" panose="020B0604020202020204" pitchFamily="34" charset="0"/>
-              <a:buChar char="•"/>
-            </a:pPr>
-            <a:endParaRPr lang="en-US" dirty="0"/>
           </a:p>
           <a:p>
             <a:pPr>
@@ -5319,7 +5312,7 @@
         </p:nvSpPr>
         <p:spPr>
           <a:xfrm>
-            <a:off x="4563639" y="1375706"/>
+            <a:off x="4689474" y="1375706"/>
             <a:ext cx="4236412" cy="3831818"/>
           </a:xfrm>
           <a:prstGeom prst="rect">
@@ -5414,6 +5407,36 @@
           </a:p>
         </p:txBody>
       </p:sp>
+      <p:pic>
+        <p:nvPicPr>
+          <p:cNvPr id="8" name="Immagine 7">
+            <a:extLst>
+              <a:ext uri="{FF2B5EF4-FFF2-40B4-BE49-F238E27FC236}">
+                <a16:creationId xmlns:a16="http://schemas.microsoft.com/office/drawing/2014/main" id="{7228F772-354E-46A8-BD2E-CC2D98B3EC33}"/>
+              </a:ext>
+            </a:extLst>
+          </p:cNvPr>
+          <p:cNvPicPr>
+            <a:picLocks noChangeAspect="1"/>
+          </p:cNvPicPr>
+          <p:nvPr/>
+        </p:nvPicPr>
+        <p:blipFill>
+          <a:blip r:embed="rId2"/>
+          <a:stretch>
+            <a:fillRect/>
+          </a:stretch>
+        </p:blipFill>
+        <p:spPr>
+          <a:xfrm>
+            <a:off x="2182623" y="4174440"/>
+            <a:ext cx="2647950" cy="2200275"/>
+          </a:xfrm>
+          <a:prstGeom prst="rect">
+            <a:avLst/>
+          </a:prstGeom>
+        </p:spPr>
+      </p:pic>
     </p:spTree>
     <p:extLst>
       <p:ext uri="{BB962C8B-B14F-4D97-AF65-F5344CB8AC3E}">

</xml_diff>

<commit_message>
Presentation updated - last version
</commit_message>
<xml_diff>
--- a/Documents/JustRecipe Presentation.pptx
+++ b/Documents/JustRecipe Presentation.pptx
@@ -4007,7 +4007,7 @@
               <a:t>The </a:t>
             </a:r>
             <a:r>
-              <a:rPr lang="en-US" dirty="0" err="1"/>
+              <a:rPr lang="en-US" b="1" dirty="0" err="1"/>
               <a:t>JustRecipe</a:t>
             </a:r>
             <a:r>
@@ -4024,7 +4024,15 @@
             </a:pPr>
             <a:r>
               <a:rPr lang="en-US" dirty="0"/>
-              <a:t>The main features of the application are:</a:t>
+              <a:t>The </a:t>
+            </a:r>
+            <a:r>
+              <a:rPr lang="en-US" b="1" dirty="0"/>
+              <a:t>main features </a:t>
+            </a:r>
+            <a:r>
+              <a:rPr lang="en-US" dirty="0"/>
+              <a:t>of the application are:</a:t>
             </a:r>
           </a:p>
           <a:p>
@@ -4120,6 +4128,36 @@
           </a:p>
         </p:txBody>
       </p:sp>
+      <p:pic>
+        <p:nvPicPr>
+          <p:cNvPr id="5" name="Immagine 4">
+            <a:extLst>
+              <a:ext uri="{FF2B5EF4-FFF2-40B4-BE49-F238E27FC236}">
+                <a16:creationId xmlns:a16="http://schemas.microsoft.com/office/drawing/2014/main" id="{E90B04AE-E812-41C0-B728-19B55931F5D4}"/>
+              </a:ext>
+            </a:extLst>
+          </p:cNvPr>
+          <p:cNvPicPr>
+            <a:picLocks noChangeAspect="1"/>
+          </p:cNvPicPr>
+          <p:nvPr/>
+        </p:nvPicPr>
+        <p:blipFill>
+          <a:blip r:embed="rId2"/>
+          <a:stretch>
+            <a:fillRect/>
+          </a:stretch>
+        </p:blipFill>
+        <p:spPr>
+          <a:xfrm>
+            <a:off x="5568891" y="2376938"/>
+            <a:ext cx="2719432" cy="3107922"/>
+          </a:xfrm>
+          <a:prstGeom prst="rect">
+            <a:avLst/>
+          </a:prstGeom>
+        </p:spPr>
+      </p:pic>
     </p:spTree>
     <p:extLst>
       <p:ext uri="{BB962C8B-B14F-4D97-AF65-F5344CB8AC3E}">
@@ -4671,7 +4709,7 @@
             <a:pPr lvl="0"/>
             <a:r>
               <a:rPr lang="en-US" dirty="0"/>
-              <a:t>81775 recipes (121 MB)</a:t>
+              <a:t>45349 recipes (62 MB)</a:t>
             </a:r>
           </a:p>
           <a:p>
@@ -4830,6 +4868,36 @@
           </a:p>
         </p:txBody>
       </p:sp>
+      <p:pic>
+        <p:nvPicPr>
+          <p:cNvPr id="4" name="Immagine 3">
+            <a:extLst>
+              <a:ext uri="{FF2B5EF4-FFF2-40B4-BE49-F238E27FC236}">
+                <a16:creationId xmlns:a16="http://schemas.microsoft.com/office/drawing/2014/main" id="{69C9C2E5-6931-4D2E-AA62-34E4288EB82C}"/>
+              </a:ext>
+            </a:extLst>
+          </p:cNvPr>
+          <p:cNvPicPr>
+            <a:picLocks noChangeAspect="1"/>
+          </p:cNvPicPr>
+          <p:nvPr/>
+        </p:nvPicPr>
+        <p:blipFill>
+          <a:blip r:embed="rId2"/>
+          <a:stretch>
+            <a:fillRect/>
+          </a:stretch>
+        </p:blipFill>
+        <p:spPr>
+          <a:xfrm>
+            <a:off x="1012569" y="1233093"/>
+            <a:ext cx="7118861" cy="4572699"/>
+          </a:xfrm>
+          <a:prstGeom prst="rect">
+            <a:avLst/>
+          </a:prstGeom>
+        </p:spPr>
+      </p:pic>
     </p:spTree>
     <p:extLst>
       <p:ext uri="{BB962C8B-B14F-4D97-AF65-F5344CB8AC3E}">
@@ -5068,7 +5136,7 @@
             </a:pPr>
             <a:r>
               <a:rPr lang="en-US" dirty="0"/>
-              <a:t>Most fast recipes</a:t>
+              <a:t>Fastest recipes</a:t>
             </a:r>
           </a:p>
           <a:p>

</xml_diff>

<commit_message>
Added final version of the presentation and added a first version of LaTex doc
</commit_message>
<xml_diff>
--- a/Documents/JustRecipe Presentation.pptx
+++ b/Documents/JustRecipe Presentation.pptx
@@ -267,7 +267,7 @@
           <a:p>
             <a:fld id="{0EF95162-6873-F647-B392-BF6A1F606277}" type="datetimeFigureOut">
               <a:rPr lang="it-IT" smtClean="0"/>
-              <a:t>02/12/2020</a:t>
+              <a:t>03/12/2020</a:t>
             </a:fld>
             <a:endParaRPr lang="it-IT"/>
           </a:p>
@@ -721,7 +721,7 @@
           <a:p>
             <a:fld id="{2FDCBEE4-315A-8E42-835E-29A1DAE07625}" type="datetimeFigureOut">
               <a:rPr lang="it-IT" smtClean="0"/>
-              <a:t>02/12/2020</a:t>
+              <a:t>03/12/2020</a:t>
             </a:fld>
             <a:endParaRPr lang="it-IT"/>
           </a:p>
@@ -913,7 +913,7 @@
           <a:p>
             <a:fld id="{2FDCBEE4-315A-8E42-835E-29A1DAE07625}" type="datetimeFigureOut">
               <a:rPr lang="it-IT" smtClean="0"/>
-              <a:t>02/12/2020</a:t>
+              <a:t>03/12/2020</a:t>
             </a:fld>
             <a:endParaRPr lang="it-IT"/>
           </a:p>
@@ -1115,7 +1115,7 @@
           <a:p>
             <a:fld id="{2FDCBEE4-315A-8E42-835E-29A1DAE07625}" type="datetimeFigureOut">
               <a:rPr lang="it-IT" smtClean="0"/>
-              <a:t>02/12/2020</a:t>
+              <a:t>03/12/2020</a:t>
             </a:fld>
             <a:endParaRPr lang="it-IT"/>
           </a:p>
@@ -1307,7 +1307,7 @@
           <a:p>
             <a:fld id="{2FDCBEE4-315A-8E42-835E-29A1DAE07625}" type="datetimeFigureOut">
               <a:rPr lang="it-IT" smtClean="0"/>
-              <a:t>02/12/2020</a:t>
+              <a:t>03/12/2020</a:t>
             </a:fld>
             <a:endParaRPr lang="it-IT"/>
           </a:p>
@@ -1576,7 +1576,7 @@
           <a:p>
             <a:fld id="{2FDCBEE4-315A-8E42-835E-29A1DAE07625}" type="datetimeFigureOut">
               <a:rPr lang="it-IT" smtClean="0"/>
-              <a:t>02/12/2020</a:t>
+              <a:t>03/12/2020</a:t>
             </a:fld>
             <a:endParaRPr lang="it-IT"/>
           </a:p>
@@ -1885,7 +1885,7 @@
           <a:p>
             <a:fld id="{2FDCBEE4-315A-8E42-835E-29A1DAE07625}" type="datetimeFigureOut">
               <a:rPr lang="it-IT" smtClean="0"/>
-              <a:t>02/12/2020</a:t>
+              <a:t>03/12/2020</a:t>
             </a:fld>
             <a:endParaRPr lang="it-IT"/>
           </a:p>
@@ -2328,7 +2328,7 @@
           <a:p>
             <a:fld id="{2FDCBEE4-315A-8E42-835E-29A1DAE07625}" type="datetimeFigureOut">
               <a:rPr lang="it-IT" smtClean="0"/>
-              <a:t>02/12/2020</a:t>
+              <a:t>03/12/2020</a:t>
             </a:fld>
             <a:endParaRPr lang="it-IT"/>
           </a:p>
@@ -2469,7 +2469,7 @@
           <a:p>
             <a:fld id="{2FDCBEE4-315A-8E42-835E-29A1DAE07625}" type="datetimeFigureOut">
               <a:rPr lang="it-IT" smtClean="0"/>
-              <a:t>02/12/2020</a:t>
+              <a:t>03/12/2020</a:t>
             </a:fld>
             <a:endParaRPr lang="it-IT"/>
           </a:p>
@@ -2588,7 +2588,7 @@
           <a:p>
             <a:fld id="{2FDCBEE4-315A-8E42-835E-29A1DAE07625}" type="datetimeFigureOut">
               <a:rPr lang="it-IT" smtClean="0"/>
-              <a:t>02/12/2020</a:t>
+              <a:t>03/12/2020</a:t>
             </a:fld>
             <a:endParaRPr lang="it-IT"/>
           </a:p>
@@ -2887,7 +2887,7 @@
           <a:p>
             <a:fld id="{2FDCBEE4-315A-8E42-835E-29A1DAE07625}" type="datetimeFigureOut">
               <a:rPr lang="it-IT" smtClean="0"/>
-              <a:t>02/12/2020</a:t>
+              <a:t>03/12/2020</a:t>
             </a:fld>
             <a:endParaRPr lang="it-IT"/>
           </a:p>
@@ -3163,7 +3163,7 @@
           <a:p>
             <a:fld id="{2FDCBEE4-315A-8E42-835E-29A1DAE07625}" type="datetimeFigureOut">
               <a:rPr lang="it-IT" smtClean="0"/>
-              <a:t>02/12/2020</a:t>
+              <a:t>03/12/2020</a:t>
             </a:fld>
             <a:endParaRPr lang="it-IT"/>
           </a:p>
@@ -4709,7 +4709,7 @@
             <a:pPr lvl="0"/>
             <a:r>
               <a:rPr lang="en-US" dirty="0"/>
-              <a:t>45349 recipes (62 MB)</a:t>
+              <a:t>45349 recipes (67.8 MB)</a:t>
             </a:r>
           </a:p>
           <a:p>
@@ -4870,10 +4870,10 @@
       </p:sp>
       <p:pic>
         <p:nvPicPr>
-          <p:cNvPr id="4" name="Immagine 3">
+          <p:cNvPr id="9" name="Immagine 8">
             <a:extLst>
               <a:ext uri="{FF2B5EF4-FFF2-40B4-BE49-F238E27FC236}">
-                <a16:creationId xmlns:a16="http://schemas.microsoft.com/office/drawing/2014/main" id="{69C9C2E5-6931-4D2E-AA62-34E4288EB82C}"/>
+                <a16:creationId xmlns:a16="http://schemas.microsoft.com/office/drawing/2014/main" id="{BDEEEC07-6C2C-4DA9-A394-F20B4657D1B2}"/>
               </a:ext>
             </a:extLst>
           </p:cNvPr>
@@ -4890,8 +4890,8 @@
         </p:blipFill>
         <p:spPr>
           <a:xfrm>
-            <a:off x="1012569" y="1233093"/>
-            <a:ext cx="7118861" cy="4572699"/>
+            <a:off x="935168" y="1233093"/>
+            <a:ext cx="7273664" cy="4512484"/>
           </a:xfrm>
           <a:prstGeom prst="rect">
             <a:avLst/>
@@ -4980,7 +4980,7 @@
         <p:spPr>
           <a:xfrm>
             <a:off x="414206" y="1226295"/>
-            <a:ext cx="8547053" cy="5370701"/>
+            <a:ext cx="8547053" cy="5498941"/>
           </a:xfrm>
           <a:prstGeom prst="rect">
             <a:avLst/>
@@ -5008,6 +5008,9 @@
               <a:lnSpc>
                 <a:spcPts val="3000"/>
               </a:lnSpc>
+              <a:spcAft>
+                <a:spcPts val="1000"/>
+              </a:spcAft>
               <a:buFont typeface="Arial" panose="020B0604020202020204" pitchFamily="34" charset="0"/>
               <a:buChar char="•"/>
             </a:pPr>
@@ -5015,14 +5018,6 @@
               <a:rPr lang="en-US" dirty="0"/>
               <a:t>Recipe</a:t>
             </a:r>
-          </a:p>
-          <a:p>
-            <a:pPr lvl="0">
-              <a:lnSpc>
-                <a:spcPts val="3000"/>
-              </a:lnSpc>
-            </a:pPr>
-            <a:endParaRPr lang="en-US" dirty="0"/>
           </a:p>
           <a:p>
             <a:pPr lvl="0">
@@ -5049,6 +5044,19 @@
             </a:r>
           </a:p>
           <a:p>
+            <a:pPr marL="342900" indent="-342900">
+              <a:lnSpc>
+                <a:spcPts val="3000"/>
+              </a:lnSpc>
+              <a:buFont typeface="Arial" panose="020B0604020202020204" pitchFamily="34" charset="0"/>
+              <a:buChar char="•"/>
+            </a:pPr>
+            <a:r>
+              <a:rPr lang="en-US" dirty="0"/>
+              <a:t>Low caloric recipes, low fat recipes, low carbs recipes, high protein recipes</a:t>
+            </a:r>
+          </a:p>
+          <a:p>
             <a:pPr marL="342900" lvl="0" indent="-342900">
               <a:lnSpc>
                 <a:spcPts val="3000"/>
@@ -5057,8 +5065,8 @@
               <a:buChar char="•"/>
             </a:pPr>
             <a:r>
-              <a:rPr lang="en-US" dirty="0"/>
-              <a:t>Low caloric recipes</a:t>
+              <a:rPr lang="en-US" i="1" dirty="0"/>
+              <a:t>Search the most common recipe categories</a:t>
             </a:r>
           </a:p>
           <a:p>
@@ -5070,8 +5078,8 @@
               <a:buChar char="•"/>
             </a:pPr>
             <a:r>
-              <a:rPr lang="en-US" dirty="0"/>
-              <a:t>Low fat recipes</a:t>
+              <a:rPr lang="en-US" i="1" dirty="0"/>
+              <a:t>Last written comments (for moderator)</a:t>
             </a:r>
           </a:p>
           <a:p>
@@ -5083,8 +5091,8 @@
               <a:buChar char="•"/>
             </a:pPr>
             <a:r>
-              <a:rPr lang="en-US" dirty="0"/>
-              <a:t>High protein recipes</a:t>
+              <a:rPr lang="en-US" i="1" dirty="0"/>
+              <a:t>Categories under/over a caloric/carbs/fat/protein average</a:t>
             </a:r>
           </a:p>
           <a:p>
@@ -5096,8 +5104,8 @@
               <a:buChar char="•"/>
             </a:pPr>
             <a:r>
-              <a:rPr lang="en-US" dirty="0"/>
-              <a:t>Low carbs recipes</a:t>
+              <a:rPr lang="en-US" i="1" dirty="0"/>
+              <a:t>Show the daily sum of recipe calories added by a user in the last week. A plot will show the weekly trend </a:t>
             </a:r>
           </a:p>
           <a:p>
@@ -5110,20 +5118,7 @@
             </a:pPr>
             <a:r>
               <a:rPr lang="en-US" dirty="0"/>
-              <a:t>Last written comments (for moderator)</a:t>
-            </a:r>
-          </a:p>
-          <a:p>
-            <a:pPr marL="342900" lvl="0" indent="-342900">
-              <a:lnSpc>
-                <a:spcPts val="3000"/>
-              </a:lnSpc>
-              <a:buFont typeface="Arial" panose="020B0604020202020204" pitchFamily="34" charset="0"/>
-              <a:buChar char="•"/>
-            </a:pPr>
-            <a:r>
-              <a:rPr lang="en-US" dirty="0"/>
-              <a:t>Last written recipes of the following users (for the user)</a:t>
+              <a:t>Last written recipes of the following users </a:t>
             </a:r>
           </a:p>
           <a:p>

</xml_diff>

<commit_message>
First Version of the documentation
</commit_message>
<xml_diff>
--- a/Documents/JustRecipe Presentation.pptx
+++ b/Documents/JustRecipe Presentation.pptx
@@ -267,7 +267,7 @@
           <a:p>
             <a:fld id="{0EF95162-6873-F647-B392-BF6A1F606277}" type="datetimeFigureOut">
               <a:rPr lang="it-IT" smtClean="0"/>
-              <a:t>03/12/2020</a:t>
+              <a:t>05/12/2020</a:t>
             </a:fld>
             <a:endParaRPr lang="it-IT"/>
           </a:p>
@@ -721,7 +721,7 @@
           <a:p>
             <a:fld id="{2FDCBEE4-315A-8E42-835E-29A1DAE07625}" type="datetimeFigureOut">
               <a:rPr lang="it-IT" smtClean="0"/>
-              <a:t>03/12/2020</a:t>
+              <a:t>05/12/2020</a:t>
             </a:fld>
             <a:endParaRPr lang="it-IT"/>
           </a:p>
@@ -913,7 +913,7 @@
           <a:p>
             <a:fld id="{2FDCBEE4-315A-8E42-835E-29A1DAE07625}" type="datetimeFigureOut">
               <a:rPr lang="it-IT" smtClean="0"/>
-              <a:t>03/12/2020</a:t>
+              <a:t>05/12/2020</a:t>
             </a:fld>
             <a:endParaRPr lang="it-IT"/>
           </a:p>
@@ -1115,7 +1115,7 @@
           <a:p>
             <a:fld id="{2FDCBEE4-315A-8E42-835E-29A1DAE07625}" type="datetimeFigureOut">
               <a:rPr lang="it-IT" smtClean="0"/>
-              <a:t>03/12/2020</a:t>
+              <a:t>05/12/2020</a:t>
             </a:fld>
             <a:endParaRPr lang="it-IT"/>
           </a:p>
@@ -1307,7 +1307,7 @@
           <a:p>
             <a:fld id="{2FDCBEE4-315A-8E42-835E-29A1DAE07625}" type="datetimeFigureOut">
               <a:rPr lang="it-IT" smtClean="0"/>
-              <a:t>03/12/2020</a:t>
+              <a:t>05/12/2020</a:t>
             </a:fld>
             <a:endParaRPr lang="it-IT"/>
           </a:p>
@@ -1576,7 +1576,7 @@
           <a:p>
             <a:fld id="{2FDCBEE4-315A-8E42-835E-29A1DAE07625}" type="datetimeFigureOut">
               <a:rPr lang="it-IT" smtClean="0"/>
-              <a:t>03/12/2020</a:t>
+              <a:t>05/12/2020</a:t>
             </a:fld>
             <a:endParaRPr lang="it-IT"/>
           </a:p>
@@ -1885,7 +1885,7 @@
           <a:p>
             <a:fld id="{2FDCBEE4-315A-8E42-835E-29A1DAE07625}" type="datetimeFigureOut">
               <a:rPr lang="it-IT" smtClean="0"/>
-              <a:t>03/12/2020</a:t>
+              <a:t>05/12/2020</a:t>
             </a:fld>
             <a:endParaRPr lang="it-IT"/>
           </a:p>
@@ -2328,7 +2328,7 @@
           <a:p>
             <a:fld id="{2FDCBEE4-315A-8E42-835E-29A1DAE07625}" type="datetimeFigureOut">
               <a:rPr lang="it-IT" smtClean="0"/>
-              <a:t>03/12/2020</a:t>
+              <a:t>05/12/2020</a:t>
             </a:fld>
             <a:endParaRPr lang="it-IT"/>
           </a:p>
@@ -2469,7 +2469,7 @@
           <a:p>
             <a:fld id="{2FDCBEE4-315A-8E42-835E-29A1DAE07625}" type="datetimeFigureOut">
               <a:rPr lang="it-IT" smtClean="0"/>
-              <a:t>03/12/2020</a:t>
+              <a:t>05/12/2020</a:t>
             </a:fld>
             <a:endParaRPr lang="it-IT"/>
           </a:p>
@@ -2588,7 +2588,7 @@
           <a:p>
             <a:fld id="{2FDCBEE4-315A-8E42-835E-29A1DAE07625}" type="datetimeFigureOut">
               <a:rPr lang="it-IT" smtClean="0"/>
-              <a:t>03/12/2020</a:t>
+              <a:t>05/12/2020</a:t>
             </a:fld>
             <a:endParaRPr lang="it-IT"/>
           </a:p>
@@ -2887,7 +2887,7 @@
           <a:p>
             <a:fld id="{2FDCBEE4-315A-8E42-835E-29A1DAE07625}" type="datetimeFigureOut">
               <a:rPr lang="it-IT" smtClean="0"/>
-              <a:t>03/12/2020</a:t>
+              <a:t>05/12/2020</a:t>
             </a:fld>
             <a:endParaRPr lang="it-IT"/>
           </a:p>
@@ -3163,7 +3163,7 @@
           <a:p>
             <a:fld id="{2FDCBEE4-315A-8E42-835E-29A1DAE07625}" type="datetimeFigureOut">
               <a:rPr lang="it-IT" smtClean="0"/>
-              <a:t>03/12/2020</a:t>
+              <a:t>05/12/2020</a:t>
             </a:fld>
             <a:endParaRPr lang="it-IT"/>
           </a:p>

</xml_diff>